<commit_message>
a tiny fix for ppt.pptx and report.pdf - remove one contractor
</commit_message>
<xml_diff>
--- a/docs/ppt.pptx
+++ b/docs/ppt.pptx
@@ -217,7 +217,7 @@
           <a:p>
             <a:fld id="{0516F008-7690-4C90-8E73-725A9A709B2A}" type="datetimeFigureOut">
               <a:rPr lang="ru-RU" smtClean="0"/>
-              <a:t>03.06.2022</a:t>
+              <a:t>15.06.2022</a:t>
             </a:fld>
             <a:endParaRPr lang="ru-RU"/>
           </a:p>
@@ -612,7 +612,7 @@
           <a:p>
             <a:fld id="{B6506396-9607-42B9-9B6D-6F2E9FAFD7E8}" type="datetime1">
               <a:rPr lang="en-US" smtClean="0"/>
-              <a:t>6/3/2022</a:t>
+              <a:t>6/15/2022</a:t>
             </a:fld>
             <a:endParaRPr lang="en-US"/>
           </a:p>
@@ -819,7 +819,7 @@
           <a:p>
             <a:fld id="{052917E5-B2AB-4C6E-A37D-F710C07C0990}" type="datetime1">
               <a:rPr lang="en-US" smtClean="0"/>
-              <a:t>6/3/2022</a:t>
+              <a:t>6/15/2022</a:t>
             </a:fld>
             <a:endParaRPr lang="en-US"/>
           </a:p>
@@ -1000,7 +1000,7 @@
           <a:p>
             <a:fld id="{528E8F29-5B1F-400C-9108-786AE0908DC6}" type="datetime1">
               <a:rPr lang="en-US" smtClean="0"/>
-              <a:t>6/3/2022</a:t>
+              <a:t>6/15/2022</a:t>
             </a:fld>
             <a:endParaRPr lang="en-US"/>
           </a:p>
@@ -1171,7 +1171,7 @@
           <a:p>
             <a:fld id="{4A4A6F75-B481-4FB0-9C24-B92C10C51675}" type="datetime1">
               <a:rPr lang="en-US" smtClean="0"/>
-              <a:t>6/3/2022</a:t>
+              <a:t>6/15/2022</a:t>
             </a:fld>
             <a:endParaRPr lang="en-US"/>
           </a:p>
@@ -1418,7 +1418,7 @@
           <a:p>
             <a:fld id="{1B286B2F-2E61-40CC-9C7B-D882659F7BB6}" type="datetime1">
               <a:rPr lang="en-US" smtClean="0"/>
-              <a:t>6/3/2022</a:t>
+              <a:t>6/15/2022</a:t>
             </a:fld>
             <a:endParaRPr lang="en-US"/>
           </a:p>
@@ -1651,7 +1651,7 @@
           <a:p>
             <a:fld id="{9F27B9D6-E19A-422E-BAF6-B0DDC5B71A92}" type="datetime1">
               <a:rPr lang="en-US" smtClean="0"/>
-              <a:t>6/3/2022</a:t>
+              <a:t>6/15/2022</a:t>
             </a:fld>
             <a:endParaRPr lang="en-US"/>
           </a:p>
@@ -2019,7 +2019,7 @@
           <a:p>
             <a:fld id="{67D40A85-6861-489D-B2AB-048FAFC680EE}" type="datetime1">
               <a:rPr lang="en-US" smtClean="0"/>
-              <a:t>6/3/2022</a:t>
+              <a:t>6/15/2022</a:t>
             </a:fld>
             <a:endParaRPr lang="en-US"/>
           </a:p>
@@ -2138,7 +2138,7 @@
           <a:p>
             <a:fld id="{BF544EAC-A958-4E65-B890-932AE75109CB}" type="datetime1">
               <a:rPr lang="en-US" smtClean="0"/>
-              <a:t>6/3/2022</a:t>
+              <a:t>6/15/2022</a:t>
             </a:fld>
             <a:endParaRPr lang="en-US"/>
           </a:p>
@@ -2234,7 +2234,7 @@
           <a:p>
             <a:fld id="{3F93044C-531D-47B5-B2BD-97D9961B7612}" type="datetime1">
               <a:rPr lang="en-US" smtClean="0"/>
-              <a:t>6/3/2022</a:t>
+              <a:t>6/15/2022</a:t>
             </a:fld>
             <a:endParaRPr lang="en-US"/>
           </a:p>
@@ -2512,7 +2512,7 @@
           <a:p>
             <a:fld id="{924F0C8E-EB84-4357-A959-E7798C9FFF0A}" type="datetime1">
               <a:rPr lang="en-US" smtClean="0"/>
-              <a:t>6/3/2022</a:t>
+              <a:t>6/15/2022</a:t>
             </a:fld>
             <a:endParaRPr lang="en-US"/>
           </a:p>
@@ -2770,7 +2770,7 @@
           <a:p>
             <a:fld id="{6CFD3D08-C000-48B6-9982-F348951CA041}" type="datetime1">
               <a:rPr lang="en-US" smtClean="0"/>
-              <a:t>6/3/2022</a:t>
+              <a:t>6/15/2022</a:t>
             </a:fld>
             <a:endParaRPr lang="en-US"/>
           </a:p>
@@ -2984,7 +2984,7 @@
           <a:p>
             <a:fld id="{4D592708-8ABB-4B1D-985A-B3AFDFECBF41}" type="datetime1">
               <a:rPr lang="en-US" smtClean="0"/>
-              <a:t>6/3/2022</a:t>
+              <a:t>6/15/2022</a:t>
             </a:fld>
             <a:endParaRPr lang="en-US"/>
           </a:p>
@@ -3547,23 +3547,6 @@
           <a:p>
             <a:pPr algn="r"/>
             <a:r>
-              <a:rPr lang="ru-RU" dirty="0" err="1">
-                <a:latin typeface="Arial" panose="020B0604020202020204" pitchFamily="34" charset="0"/>
-                <a:cs typeface="Arial" panose="020B0604020202020204" pitchFamily="34" charset="0"/>
-              </a:rPr>
-              <a:t>Тарлыков</a:t>
-            </a:r>
-            <a:r>
-              <a:rPr lang="ru-RU" dirty="0">
-                <a:latin typeface="Arial" panose="020B0604020202020204" pitchFamily="34" charset="0"/>
-                <a:cs typeface="Arial" panose="020B0604020202020204" pitchFamily="34" charset="0"/>
-              </a:rPr>
-              <a:t> А. В</a:t>
-            </a:r>
-          </a:p>
-          <a:p>
-            <a:pPr algn="r"/>
-            <a:r>
               <a:rPr lang="ru-RU" dirty="0">
                 <a:latin typeface="Arial" panose="020B0604020202020204" pitchFamily="34" charset="0"/>
                 <a:cs typeface="Arial" panose="020B0604020202020204" pitchFamily="34" charset="0"/>
@@ -3726,28 +3709,18 @@
           <a:p>
             <a:pPr algn="r"/>
             <a:r>
-              <a:rPr lang="ru-RU" dirty="0" err="1">
+              <a:rPr lang="ru-RU">
                 <a:latin typeface="Arial" panose="020B0604020202020204" pitchFamily="34" charset="0"/>
                 <a:cs typeface="Arial" panose="020B0604020202020204" pitchFamily="34" charset="0"/>
               </a:rPr>
-              <a:t>Тарлыков</a:t>
+              <a:t>Воронежский </a:t>
             </a:r>
             <a:r>
               <a:rPr lang="ru-RU" dirty="0">
                 <a:latin typeface="Arial" panose="020B0604020202020204" pitchFamily="34" charset="0"/>
                 <a:cs typeface="Arial" panose="020B0604020202020204" pitchFamily="34" charset="0"/>
               </a:rPr>
-              <a:t> А. В</a:t>
-            </a:r>
-          </a:p>
-          <a:p>
-            <a:pPr algn="r"/>
-            <a:r>
-              <a:rPr lang="ru-RU" dirty="0">
-                <a:latin typeface="Arial" panose="020B0604020202020204" pitchFamily="34" charset="0"/>
-                <a:cs typeface="Arial" panose="020B0604020202020204" pitchFamily="34" charset="0"/>
-              </a:rPr>
-              <a:t>Воронежский Государственный Университет</a:t>
+              <a:t>Государственный Университет</a:t>
             </a:r>
             <a:endParaRPr lang="en-US" dirty="0">
               <a:latin typeface="Arial" panose="020B0604020202020204" pitchFamily="34" charset="0"/>
@@ -3839,12 +3812,12 @@
         <p:spPr>
           <a:xfrm>
             <a:off x="2152650" y="969947"/>
-            <a:ext cx="8272069" cy="5036570"/>
+            <a:ext cx="8272069" cy="5522926"/>
           </a:xfrm>
         </p:spPr>
         <p:txBody>
           <a:bodyPr>
-            <a:normAutofit fontScale="62500" lnSpcReduction="20000"/>
+            <a:normAutofit fontScale="70000" lnSpcReduction="20000"/>
           </a:bodyPr>
           <a:lstStyle/>
           <a:p>
@@ -4448,7 +4421,7 @@
                 <a:ea typeface="Calibri" panose="020F0502020204030204" pitchFamily="34" charset="0"/>
                 <a:cs typeface="Times New Roman" panose="02020603050405020304" pitchFamily="18" charset="0"/>
               </a:rPr>
-              <a:t>Клиент-серверное приложение</a:t>
+              <a:t>  Клиент-серверное приложение</a:t>
             </a:r>
           </a:p>
           <a:p>
@@ -4465,7 +4438,7 @@
                 <a:ea typeface="Calibri" panose="020F0502020204030204" pitchFamily="34" charset="0"/>
                 <a:cs typeface="Times New Roman" panose="02020603050405020304" pitchFamily="18" charset="0"/>
               </a:rPr>
-              <a:t>Авторизация</a:t>
+              <a:t>  Авторизация</a:t>
             </a:r>
           </a:p>
           <a:p>
@@ -4482,7 +4455,7 @@
                 <a:ea typeface="Calibri" panose="020F0502020204030204" pitchFamily="34" charset="0"/>
                 <a:cs typeface="Times New Roman" panose="02020603050405020304" pitchFamily="18" charset="0"/>
               </a:rPr>
-              <a:t>Пользование без регистрации</a:t>
+              <a:t>  Пользование без регистрации</a:t>
             </a:r>
           </a:p>
           <a:p>
@@ -4499,7 +4472,7 @@
                 <a:ea typeface="Calibri" panose="020F0502020204030204" pitchFamily="34" charset="0"/>
                 <a:cs typeface="Times New Roman" panose="02020603050405020304" pitchFamily="18" charset="0"/>
               </a:rPr>
-              <a:t>Задание предпочтений</a:t>
+              <a:t>  Задание предпочтений</a:t>
             </a:r>
           </a:p>
           <a:p>
@@ -4516,7 +4489,7 @@
                 <a:ea typeface="Calibri" panose="020F0502020204030204" pitchFamily="34" charset="0"/>
                 <a:cs typeface="Times New Roman" panose="02020603050405020304" pitchFamily="18" charset="0"/>
               </a:rPr>
-              <a:t>Рекомендации по предпочтениям</a:t>
+              <a:t>  Рекомендации по предпочтениям</a:t>
             </a:r>
           </a:p>
           <a:p>
@@ -4528,12 +4501,20 @@
               <a:buChar char="‒"/>
             </a:pPr>
             <a:r>
+              <a:rPr lang="ru-RU" sz="3600">
+                <a:latin typeface="Calibri" panose="020F0502020204030204" pitchFamily="34" charset="0"/>
+                <a:ea typeface="Calibri" panose="020F0502020204030204" pitchFamily="34" charset="0"/>
+                <a:cs typeface="Times New Roman" panose="02020603050405020304" pitchFamily="18" charset="0"/>
+              </a:rPr>
+              <a:t>  Пополнение </a:t>
+            </a:r>
+            <a:r>
               <a:rPr lang="ru-RU" sz="3600" dirty="0">
                 <a:latin typeface="Calibri" panose="020F0502020204030204" pitchFamily="34" charset="0"/>
                 <a:ea typeface="Calibri" panose="020F0502020204030204" pitchFamily="34" charset="0"/>
                 <a:cs typeface="Times New Roman" panose="02020603050405020304" pitchFamily="18" charset="0"/>
               </a:rPr>
-              <a:t>Пополнение списка музыки</a:t>
+              <a:t>списка музыки</a:t>
             </a:r>
           </a:p>
         </p:txBody>
@@ -4860,10 +4841,10 @@
       </p:pic>
       <p:pic>
         <p:nvPicPr>
-          <p:cNvPr id="8" name="Рисунок 7">
+          <p:cNvPr id="10" name="Рисунок 9">
             <a:extLst>
               <a:ext uri="{FF2B5EF4-FFF2-40B4-BE49-F238E27FC236}">
-                <a16:creationId xmlns:a16="http://schemas.microsoft.com/office/drawing/2014/main" id="{74E634EE-20C0-4DD7-A898-2C8E14BA8532}"/>
+                <a16:creationId xmlns:a16="http://schemas.microsoft.com/office/drawing/2014/main" id="{BE7914B8-A1C8-4139-B670-9CBF8DA5A1A6}"/>
               </a:ext>
             </a:extLst>
           </p:cNvPr>
@@ -4880,8 +4861,8 @@
         </p:blipFill>
         <p:spPr>
           <a:xfrm>
-            <a:off x="4245574" y="1690687"/>
-            <a:ext cx="2463527" cy="4351338"/>
+            <a:off x="7670930" y="1657215"/>
+            <a:ext cx="2463527" cy="4384810"/>
           </a:xfrm>
           <a:prstGeom prst="rect">
             <a:avLst/>
@@ -4890,10 +4871,10 @@
       </p:pic>
       <p:pic>
         <p:nvPicPr>
-          <p:cNvPr id="10" name="Рисунок 9">
+          <p:cNvPr id="4" name="Рисунок 3">
             <a:extLst>
               <a:ext uri="{FF2B5EF4-FFF2-40B4-BE49-F238E27FC236}">
-                <a16:creationId xmlns:a16="http://schemas.microsoft.com/office/drawing/2014/main" id="{BE7914B8-A1C8-4139-B670-9CBF8DA5A1A6}"/>
+                <a16:creationId xmlns:a16="http://schemas.microsoft.com/office/drawing/2014/main" id="{DBD59BE3-544B-49E0-B3D0-0D30262EBAA4}"/>
               </a:ext>
             </a:extLst>
           </p:cNvPr>
@@ -4903,15 +4884,21 @@
           <p:nvPr/>
         </p:nvPicPr>
         <p:blipFill>
-          <a:blip r:embed="rId4"/>
+          <a:blip r:embed="rId4">
+            <a:extLst>
+              <a:ext uri="{28A0092B-C50C-407E-A947-70E740481C1C}">
+                <a14:useLocalDpi xmlns:a14="http://schemas.microsoft.com/office/drawing/2010/main" val="0"/>
+              </a:ext>
+            </a:extLst>
+          </a:blip>
           <a:stretch>
             <a:fillRect/>
           </a:stretch>
         </p:blipFill>
         <p:spPr>
           <a:xfrm>
-            <a:off x="7670930" y="1657215"/>
-            <a:ext cx="2463527" cy="4384810"/>
+            <a:off x="4319197" y="1657215"/>
+            <a:ext cx="2487211" cy="4384810"/>
           </a:xfrm>
           <a:prstGeom prst="rect">
             <a:avLst/>
@@ -4994,8 +4981,8 @@
         </p:nvSpPr>
         <p:spPr>
           <a:xfrm>
-            <a:off x="838200" y="1690687"/>
-            <a:ext cx="10515600" cy="4517608"/>
+            <a:off x="838199" y="1690687"/>
+            <a:ext cx="11015445" cy="4802188"/>
           </a:xfrm>
         </p:spPr>
         <p:txBody>
@@ -5016,7 +5003,7 @@
                 <a:latin typeface="Arial" panose="020B0604020202020204" pitchFamily="34" charset="0"/>
                 <a:cs typeface="Arial" panose="020B0604020202020204" pitchFamily="34" charset="0"/>
               </a:rPr>
-              <a:t>Яцкова В. Н.: анализ и обзор аналогов, поиск источников информации, наполнение глоссария</a:t>
+              <a:t>Яцкова В. Н.: анализ и обзор аналогов, источники информации, глоссарий, проверка итогового отчёта.</a:t>
             </a:r>
           </a:p>
           <a:p>

</xml_diff>

<commit_message>
a small fix for .pptx
</commit_message>
<xml_diff>
--- a/docs/ppt.pptx
+++ b/docs/ppt.pptx
@@ -1,6 +1,6 @@
 
 <file path=ppt/presentation.xml><?xml version="1.0" encoding="utf-8"?>
-<p:presentation xmlns:a="http://schemas.openxmlformats.org/drawingml/2006/main" xmlns:r="http://schemas.openxmlformats.org/officeDocument/2006/relationships" xmlns:p="http://schemas.openxmlformats.org/presentationml/2006/main" saveSubsetFonts="1">
+<p:presentation xmlns:a="http://schemas.openxmlformats.org/drawingml/2006/main" xmlns:r="http://schemas.openxmlformats.org/officeDocument/2006/relationships" xmlns:p="http://schemas.openxmlformats.org/presentationml/2006/main" showSpecialPlsOnTitleSld="0" saveSubsetFonts="1">
   <p:sldMasterIdLst>
     <p:sldMasterId id="2147483672" r:id="rId1"/>
   </p:sldMasterIdLst>
@@ -13,10 +13,10 @@
     <p:sldId id="258" r:id="rId4"/>
     <p:sldId id="259" r:id="rId5"/>
     <p:sldId id="260" r:id="rId6"/>
-    <p:sldId id="261" r:id="rId7"/>
-    <p:sldId id="262" r:id="rId8"/>
-    <p:sldId id="263" r:id="rId9"/>
-    <p:sldId id="270" r:id="rId10"/>
+    <p:sldId id="270" r:id="rId7"/>
+    <p:sldId id="261" r:id="rId8"/>
+    <p:sldId id="262" r:id="rId9"/>
+    <p:sldId id="263" r:id="rId10"/>
     <p:sldId id="269" r:id="rId11"/>
   </p:sldIdLst>
   <p:sldSz cx="12192000" cy="6858000"/>
@@ -217,7 +217,7 @@
           <a:p>
             <a:fld id="{0516F008-7690-4C90-8E73-725A9A709B2A}" type="datetimeFigureOut">
               <a:rPr lang="ru-RU" smtClean="0"/>
-              <a:t>15.06.2022</a:t>
+              <a:t>24.08.2022</a:t>
             </a:fld>
             <a:endParaRPr lang="ru-RU"/>
           </a:p>
@@ -610,9 +610,9 @@
           <a:bodyPr/>
           <a:lstStyle/>
           <a:p>
-            <a:fld id="{B6506396-9607-42B9-9B6D-6F2E9FAFD7E8}" type="datetime1">
+            <a:fld id="{98754251-F910-4C88-B8F5-E359CB3F71EE}" type="datetime1">
               <a:rPr lang="en-US" smtClean="0"/>
-              <a:t>6/15/2022</a:t>
+              <a:t>8/24/2022</a:t>
             </a:fld>
             <a:endParaRPr lang="en-US"/>
           </a:p>
@@ -817,9 +817,9 @@
           <a:bodyPr/>
           <a:lstStyle/>
           <a:p>
-            <a:fld id="{052917E5-B2AB-4C6E-A37D-F710C07C0990}" type="datetime1">
+            <a:fld id="{CE5838EF-92B9-4E01-8319-CC445B712CF6}" type="datetime1">
               <a:rPr lang="en-US" smtClean="0"/>
-              <a:t>6/15/2022</a:t>
+              <a:t>8/24/2022</a:t>
             </a:fld>
             <a:endParaRPr lang="en-US"/>
           </a:p>
@@ -998,9 +998,9 @@
           <a:bodyPr/>
           <a:lstStyle/>
           <a:p>
-            <a:fld id="{528E8F29-5B1F-400C-9108-786AE0908DC6}" type="datetime1">
+            <a:fld id="{BD8E47C0-46EC-440C-A844-712CE59FB834}" type="datetime1">
               <a:rPr lang="en-US" smtClean="0"/>
-              <a:t>6/15/2022</a:t>
+              <a:t>8/24/2022</a:t>
             </a:fld>
             <a:endParaRPr lang="en-US"/>
           </a:p>
@@ -1169,9 +1169,9 @@
           <a:bodyPr/>
           <a:lstStyle/>
           <a:p>
-            <a:fld id="{4A4A6F75-B481-4FB0-9C24-B92C10C51675}" type="datetime1">
+            <a:fld id="{5EADBEF0-D49E-4B2F-86ED-B5B5D913063F}" type="datetime1">
               <a:rPr lang="en-US" smtClean="0"/>
-              <a:t>6/15/2022</a:t>
+              <a:t>8/24/2022</a:t>
             </a:fld>
             <a:endParaRPr lang="en-US"/>
           </a:p>
@@ -1416,9 +1416,9 @@
           <a:bodyPr/>
           <a:lstStyle/>
           <a:p>
-            <a:fld id="{1B286B2F-2E61-40CC-9C7B-D882659F7BB6}" type="datetime1">
+            <a:fld id="{585BF147-0E4A-4A29-98E5-A3706FE3108F}" type="datetime1">
               <a:rPr lang="en-US" smtClean="0"/>
-              <a:t>6/15/2022</a:t>
+              <a:t>8/24/2022</a:t>
             </a:fld>
             <a:endParaRPr lang="en-US"/>
           </a:p>
@@ -1649,9 +1649,9 @@
           <a:bodyPr/>
           <a:lstStyle/>
           <a:p>
-            <a:fld id="{9F27B9D6-E19A-422E-BAF6-B0DDC5B71A92}" type="datetime1">
+            <a:fld id="{EC738481-3828-440D-8DEA-8A0959D3302F}" type="datetime1">
               <a:rPr lang="en-US" smtClean="0"/>
-              <a:t>6/15/2022</a:t>
+              <a:t>8/24/2022</a:t>
             </a:fld>
             <a:endParaRPr lang="en-US"/>
           </a:p>
@@ -2017,9 +2017,9 @@
           <a:bodyPr/>
           <a:lstStyle/>
           <a:p>
-            <a:fld id="{67D40A85-6861-489D-B2AB-048FAFC680EE}" type="datetime1">
+            <a:fld id="{27C78502-3D60-40FF-8E96-9CBAC2877809}" type="datetime1">
               <a:rPr lang="en-US" smtClean="0"/>
-              <a:t>6/15/2022</a:t>
+              <a:t>8/24/2022</a:t>
             </a:fld>
             <a:endParaRPr lang="en-US"/>
           </a:p>
@@ -2136,9 +2136,9 @@
           <a:bodyPr/>
           <a:lstStyle/>
           <a:p>
-            <a:fld id="{BF544EAC-A958-4E65-B890-932AE75109CB}" type="datetime1">
+            <a:fld id="{2985D008-694C-45FF-823C-F5D05B55BBC7}" type="datetime1">
               <a:rPr lang="en-US" smtClean="0"/>
-              <a:t>6/15/2022</a:t>
+              <a:t>8/24/2022</a:t>
             </a:fld>
             <a:endParaRPr lang="en-US"/>
           </a:p>
@@ -2232,9 +2232,9 @@
           <a:bodyPr/>
           <a:lstStyle/>
           <a:p>
-            <a:fld id="{3F93044C-531D-47B5-B2BD-97D9961B7612}" type="datetime1">
+            <a:fld id="{E4280640-07C7-41BB-ACDD-DBA54CBA38DF}" type="datetime1">
               <a:rPr lang="en-US" smtClean="0"/>
-              <a:t>6/15/2022</a:t>
+              <a:t>8/24/2022</a:t>
             </a:fld>
             <a:endParaRPr lang="en-US"/>
           </a:p>
@@ -2510,9 +2510,9 @@
           <a:bodyPr/>
           <a:lstStyle/>
           <a:p>
-            <a:fld id="{924F0C8E-EB84-4357-A959-E7798C9FFF0A}" type="datetime1">
+            <a:fld id="{03BAC909-BC54-4A14-83C4-60372F45C2B1}" type="datetime1">
               <a:rPr lang="en-US" smtClean="0"/>
-              <a:t>6/15/2022</a:t>
+              <a:t>8/24/2022</a:t>
             </a:fld>
             <a:endParaRPr lang="en-US"/>
           </a:p>
@@ -2768,9 +2768,9 @@
           <a:bodyPr/>
           <a:lstStyle/>
           <a:p>
-            <a:fld id="{6CFD3D08-C000-48B6-9982-F348951CA041}" type="datetime1">
+            <a:fld id="{BC0F5A13-4067-4CAC-9D53-F78175A76470}" type="datetime1">
               <a:rPr lang="en-US" smtClean="0"/>
-              <a:t>6/15/2022</a:t>
+              <a:t>8/24/2022</a:t>
             </a:fld>
             <a:endParaRPr lang="en-US"/>
           </a:p>
@@ -2982,9 +2982,9 @@
             </a:lvl1pPr>
           </a:lstStyle>
           <a:p>
-            <a:fld id="{4D592708-8ABB-4B1D-985A-B3AFDFECBF41}" type="datetime1">
+            <a:fld id="{7E4EF56B-10C4-4142-89D2-E156EFB6841D}" type="datetime1">
               <a:rPr lang="en-US" smtClean="0"/>
-              <a:t>6/15/2022</a:t>
+              <a:t>8/24/2022</a:t>
             </a:fld>
             <a:endParaRPr lang="en-US"/>
           </a:p>
@@ -3126,7 +3126,7 @@
     <p:sldLayoutId id="2147483682" r:id="rId10"/>
     <p:sldLayoutId id="2147483683" r:id="rId11"/>
   </p:sldLayoutIdLst>
-  <p:hf sldNum="0" hdr="0" ftr="0" dt="0"/>
+  <p:hf hdr="0" ftr="0" dt="0"/>
   <p:txStyles>
     <p:titleStyle>
       <a:lvl1pPr algn="l" defTabSz="914400" rtl="0" eaLnBrk="1" latinLnBrk="0" hangingPunct="1">
@@ -3513,25 +3513,11 @@
           <a:p>
             <a:pPr algn="r"/>
             <a:r>
-              <a:rPr lang="ru-RU" sz="3600" dirty="0">
-                <a:latin typeface="Arial" panose="020B0604020202020204" pitchFamily="34" charset="0"/>
-                <a:cs typeface="Arial" panose="020B0604020202020204" pitchFamily="34" charset="0"/>
-              </a:rPr>
-              <a:t>Команда 5-2-3</a:t>
-            </a:r>
-            <a:endParaRPr lang="en-US" sz="3600" dirty="0">
-              <a:latin typeface="Arial" panose="020B0604020202020204" pitchFamily="34" charset="0"/>
-              <a:cs typeface="Arial" panose="020B0604020202020204" pitchFamily="34" charset="0"/>
-            </a:endParaRPr>
-          </a:p>
-          <a:p>
-            <a:pPr algn="r"/>
-            <a:r>
               <a:rPr lang="ru-RU" dirty="0">
                 <a:latin typeface="Arial" panose="020B0604020202020204" pitchFamily="34" charset="0"/>
                 <a:cs typeface="Arial" panose="020B0604020202020204" pitchFamily="34" charset="0"/>
               </a:rPr>
-              <a:t>Сапелкин А. Г.</a:t>
+              <a:t>Обучающийся: Сапелкин А. Г.</a:t>
             </a:r>
           </a:p>
           <a:p>
@@ -3541,7 +3527,7 @@
                 <a:latin typeface="Arial" panose="020B0604020202020204" pitchFamily="34" charset="0"/>
                 <a:cs typeface="Arial" panose="020B0604020202020204" pitchFamily="34" charset="0"/>
               </a:rPr>
-              <a:t>Яцкова В. Н.</a:t>
+              <a:t>Руководитель: Тарасов В. С.</a:t>
             </a:r>
           </a:p>
           <a:p>
@@ -3675,25 +3661,11 @@
           <a:p>
             <a:pPr algn="r"/>
             <a:r>
-              <a:rPr lang="ru-RU" sz="3600" dirty="0">
-                <a:latin typeface="Arial" panose="020B0604020202020204" pitchFamily="34" charset="0"/>
-                <a:cs typeface="Arial" panose="020B0604020202020204" pitchFamily="34" charset="0"/>
-              </a:rPr>
-              <a:t>Команда 5-2-3</a:t>
-            </a:r>
-            <a:endParaRPr lang="en-US" sz="3600" dirty="0">
-              <a:latin typeface="Arial" panose="020B0604020202020204" pitchFamily="34" charset="0"/>
-              <a:cs typeface="Arial" panose="020B0604020202020204" pitchFamily="34" charset="0"/>
-            </a:endParaRPr>
-          </a:p>
-          <a:p>
-            <a:pPr algn="r"/>
-            <a:r>
               <a:rPr lang="ru-RU" dirty="0">
                 <a:latin typeface="Arial" panose="020B0604020202020204" pitchFamily="34" charset="0"/>
                 <a:cs typeface="Arial" panose="020B0604020202020204" pitchFamily="34" charset="0"/>
               </a:rPr>
-              <a:t>Сапелкин А. Г.</a:t>
+              <a:t>Обучающийся: Сапелкин А. Г.</a:t>
             </a:r>
           </a:p>
           <a:p>
@@ -3703,24 +3675,17 @@
                 <a:latin typeface="Arial" panose="020B0604020202020204" pitchFamily="34" charset="0"/>
                 <a:cs typeface="Arial" panose="020B0604020202020204" pitchFamily="34" charset="0"/>
               </a:rPr>
-              <a:t>Яцкова В. Н.</a:t>
+              <a:t>Руководитель: Тарасов В. С.</a:t>
             </a:r>
           </a:p>
           <a:p>
             <a:pPr algn="r"/>
-            <a:r>
-              <a:rPr lang="ru-RU">
-                <a:latin typeface="Arial" panose="020B0604020202020204" pitchFamily="34" charset="0"/>
-                <a:cs typeface="Arial" panose="020B0604020202020204" pitchFamily="34" charset="0"/>
-              </a:rPr>
-              <a:t>Воронежский </a:t>
-            </a:r>
             <a:r>
               <a:rPr lang="ru-RU" dirty="0">
                 <a:latin typeface="Arial" panose="020B0604020202020204" pitchFamily="34" charset="0"/>
                 <a:cs typeface="Arial" panose="020B0604020202020204" pitchFamily="34" charset="0"/>
               </a:rPr>
-              <a:t>Государственный Университет</a:t>
+              <a:t>Воронежский Государственный Университет</a:t>
             </a:r>
             <a:endParaRPr lang="en-US" dirty="0">
               <a:latin typeface="Arial" panose="020B0604020202020204" pitchFamily="34" charset="0"/>
@@ -3817,7 +3782,7 @@
         </p:spPr>
         <p:txBody>
           <a:bodyPr>
-            <a:normAutofit fontScale="70000" lnSpcReduction="20000"/>
+            <a:normAutofit fontScale="85000" lnSpcReduction="10000"/>
           </a:bodyPr>
           <a:lstStyle/>
           <a:p>
@@ -3896,24 +3861,42 @@
               <a:t>Результат</a:t>
             </a:r>
           </a:p>
-          <a:p>
-            <a:pPr marL="817200" indent="-685800" defTabSz="936000">
-              <a:lnSpc>
-                <a:spcPct val="200000"/>
-              </a:lnSpc>
-              <a:buFont typeface="Arial" panose="020B0604020202020204" pitchFamily="34" charset="0"/>
-              <a:buChar char="‒"/>
-            </a:pPr>
-            <a:r>
-              <a:rPr lang="ru-RU" sz="5100" dirty="0">
-                <a:latin typeface="Arial" panose="020B0604020202020204" pitchFamily="34" charset="0"/>
-                <a:cs typeface="Arial" panose="020B0604020202020204" pitchFamily="34" charset="0"/>
+        </p:txBody>
+      </p:sp>
+      <p:sp>
+        <p:nvSpPr>
+          <p:cNvPr id="5" name="Номер слайда 4">
+            <a:extLst>
+              <a:ext uri="{FF2B5EF4-FFF2-40B4-BE49-F238E27FC236}">
+                <a16:creationId xmlns:a16="http://schemas.microsoft.com/office/drawing/2014/main" id="{AE86E8DA-2506-4B4B-A883-D016823C7E08}"/>
+              </a:ext>
+            </a:extLst>
+          </p:cNvPr>
+          <p:cNvSpPr>
+            <a:spLocks noGrp="1"/>
+          </p:cNvSpPr>
+          <p:nvPr>
+            <p:ph type="sldNum" sz="quarter" idx="12"/>
+          </p:nvPr>
+        </p:nvSpPr>
+        <p:spPr/>
+        <p:txBody>
+          <a:bodyPr/>
+          <a:lstStyle/>
+          <a:p>
+            <a:fld id="{196B5BAB-2D3A-4897-B94A-ED1257D505D3}" type="slidenum">
+              <a:rPr lang="en-US" sz="1800" smtClean="0">
+                <a:solidFill>
+                  <a:schemeClr val="bg1"/>
+                </a:solidFill>
               </a:rPr>
-              <a:t>Распределение задач</a:t>
-            </a:r>
-            <a:endParaRPr lang="en-US" sz="5100" dirty="0">
-              <a:latin typeface="Arial" panose="020B0604020202020204" pitchFamily="34" charset="0"/>
-              <a:cs typeface="Arial" panose="020B0604020202020204" pitchFamily="34" charset="0"/>
+              <a:pPr/>
+              <a:t>2</a:t>
+            </a:fld>
+            <a:endParaRPr lang="en-US" sz="1800" dirty="0">
+              <a:solidFill>
+                <a:schemeClr val="bg1"/>
+              </a:solidFill>
             </a:endParaRPr>
           </a:p>
         </p:txBody>
@@ -4195,6 +4178,44 @@
           </a:p>
         </p:txBody>
       </p:sp>
+      <p:sp>
+        <p:nvSpPr>
+          <p:cNvPr id="10" name="Номер слайда 9">
+            <a:extLst>
+              <a:ext uri="{FF2B5EF4-FFF2-40B4-BE49-F238E27FC236}">
+                <a16:creationId xmlns:a16="http://schemas.microsoft.com/office/drawing/2014/main" id="{1E7FA298-05DA-4DC2-BE19-4306D22DECD1}"/>
+              </a:ext>
+            </a:extLst>
+          </p:cNvPr>
+          <p:cNvSpPr>
+            <a:spLocks noGrp="1"/>
+          </p:cNvSpPr>
+          <p:nvPr>
+            <p:ph type="sldNum" sz="quarter" idx="12"/>
+          </p:nvPr>
+        </p:nvSpPr>
+        <p:spPr/>
+        <p:txBody>
+          <a:bodyPr/>
+          <a:lstStyle/>
+          <a:p>
+            <a:fld id="{196B5BAB-2D3A-4897-B94A-ED1257D505D3}" type="slidenum">
+              <a:rPr lang="en-US" sz="1800" smtClean="0">
+                <a:solidFill>
+                  <a:schemeClr val="bg1"/>
+                </a:solidFill>
+              </a:rPr>
+              <a:pPr/>
+              <a:t>3</a:t>
+            </a:fld>
+            <a:endParaRPr lang="en-US" sz="1800" dirty="0">
+              <a:solidFill>
+                <a:schemeClr val="bg1"/>
+              </a:solidFill>
+            </a:endParaRPr>
+          </a:p>
+        </p:txBody>
+      </p:sp>
     </p:spTree>
   </p:cSld>
   <p:clrMapOvr>
@@ -4319,6 +4340,44 @@
               <a:t>Spotify</a:t>
             </a:r>
             <a:endParaRPr lang="ru-RU" sz="3200" dirty="0"/>
+          </a:p>
+        </p:txBody>
+      </p:sp>
+      <p:sp>
+        <p:nvSpPr>
+          <p:cNvPr id="4" name="Номер слайда 3">
+            <a:extLst>
+              <a:ext uri="{FF2B5EF4-FFF2-40B4-BE49-F238E27FC236}">
+                <a16:creationId xmlns:a16="http://schemas.microsoft.com/office/drawing/2014/main" id="{133BDB16-8840-4263-A97F-439544662244}"/>
+              </a:ext>
+            </a:extLst>
+          </p:cNvPr>
+          <p:cNvSpPr>
+            <a:spLocks noGrp="1"/>
+          </p:cNvSpPr>
+          <p:nvPr>
+            <p:ph type="sldNum" sz="quarter" idx="12"/>
+          </p:nvPr>
+        </p:nvSpPr>
+        <p:spPr/>
+        <p:txBody>
+          <a:bodyPr/>
+          <a:lstStyle/>
+          <a:p>
+            <a:fld id="{196B5BAB-2D3A-4897-B94A-ED1257D505D3}" type="slidenum">
+              <a:rPr lang="en-US" sz="1800" smtClean="0">
+                <a:solidFill>
+                  <a:schemeClr val="bg1"/>
+                </a:solidFill>
+              </a:rPr>
+              <a:pPr/>
+              <a:t>4</a:t>
+            </a:fld>
+            <a:endParaRPr lang="en-US" sz="1800" dirty="0">
+              <a:solidFill>
+                <a:schemeClr val="bg1"/>
+              </a:solidFill>
+            </a:endParaRPr>
           </a:p>
         </p:txBody>
       </p:sp>
@@ -4375,7 +4434,7 @@
           <a:p>
             <a:r>
               <a:rPr lang="ru-RU" dirty="0"/>
-              <a:t>Задача</a:t>
+              <a:t>Постановка задачи</a:t>
             </a:r>
           </a:p>
         </p:txBody>
@@ -4516,6 +4575,44 @@
               </a:rPr>
               <a:t>списка музыки</a:t>
             </a:r>
+          </a:p>
+        </p:txBody>
+      </p:sp>
+      <p:sp>
+        <p:nvSpPr>
+          <p:cNvPr id="5" name="Номер слайда 4">
+            <a:extLst>
+              <a:ext uri="{FF2B5EF4-FFF2-40B4-BE49-F238E27FC236}">
+                <a16:creationId xmlns:a16="http://schemas.microsoft.com/office/drawing/2014/main" id="{289C96A3-1972-40C4-B2D3-807D1E0A13C1}"/>
+              </a:ext>
+            </a:extLst>
+          </p:cNvPr>
+          <p:cNvSpPr>
+            <a:spLocks noGrp="1"/>
+          </p:cNvSpPr>
+          <p:nvPr>
+            <p:ph type="sldNum" sz="quarter" idx="12"/>
+          </p:nvPr>
+        </p:nvSpPr>
+        <p:spPr/>
+        <p:txBody>
+          <a:bodyPr/>
+          <a:lstStyle/>
+          <a:p>
+            <a:fld id="{196B5BAB-2D3A-4897-B94A-ED1257D505D3}" type="slidenum">
+              <a:rPr lang="en-US" sz="1800" smtClean="0">
+                <a:solidFill>
+                  <a:schemeClr val="bg1"/>
+                </a:solidFill>
+              </a:rPr>
+              <a:pPr/>
+              <a:t>5</a:t>
+            </a:fld>
+            <a:endParaRPr lang="en-US" sz="1800" dirty="0">
+              <a:solidFill>
+                <a:schemeClr val="bg1"/>
+              </a:solidFill>
+            </a:endParaRPr>
           </a:p>
         </p:txBody>
       </p:sp>
@@ -4533,6 +4630,137 @@
 </file>
 
 <file path=ppt/slides/slide6.xml><?xml version="1.0" encoding="utf-8"?>
+<p:sld xmlns:a="http://schemas.openxmlformats.org/drawingml/2006/main" xmlns:r="http://schemas.openxmlformats.org/officeDocument/2006/relationships" xmlns:p="http://schemas.openxmlformats.org/presentationml/2006/main">
+  <p:cSld>
+    <p:spTree>
+      <p:nvGrpSpPr>
+        <p:cNvPr id="1" name=""/>
+        <p:cNvGrpSpPr/>
+        <p:nvPr/>
+      </p:nvGrpSpPr>
+      <p:grpSpPr>
+        <a:xfrm>
+          <a:off x="0" y="0"/>
+          <a:ext cx="0" cy="0"/>
+          <a:chOff x="0" y="0"/>
+          <a:chExt cx="0" cy="0"/>
+        </a:xfrm>
+      </p:grpSpPr>
+      <p:sp>
+        <p:nvSpPr>
+          <p:cNvPr id="2" name="Заголовок 1">
+            <a:extLst>
+              <a:ext uri="{FF2B5EF4-FFF2-40B4-BE49-F238E27FC236}">
+                <a16:creationId xmlns:a16="http://schemas.microsoft.com/office/drawing/2014/main" id="{0EE123EC-2E73-4D2D-84E4-AC36D88BA40F}"/>
+              </a:ext>
+            </a:extLst>
+          </p:cNvPr>
+          <p:cNvSpPr>
+            <a:spLocks noGrp="1"/>
+          </p:cNvSpPr>
+          <p:nvPr>
+            <p:ph type="title"/>
+          </p:nvPr>
+        </p:nvSpPr>
+        <p:spPr/>
+        <p:txBody>
+          <a:bodyPr/>
+          <a:lstStyle/>
+          <a:p>
+            <a:r>
+              <a:rPr lang="ru-RU" dirty="0"/>
+              <a:t>Архитектура</a:t>
+            </a:r>
+          </a:p>
+        </p:txBody>
+      </p:sp>
+      <p:sp>
+        <p:nvSpPr>
+          <p:cNvPr id="5" name="Номер слайда 4">
+            <a:extLst>
+              <a:ext uri="{FF2B5EF4-FFF2-40B4-BE49-F238E27FC236}">
+                <a16:creationId xmlns:a16="http://schemas.microsoft.com/office/drawing/2014/main" id="{5E438E55-0F8A-4202-A8B6-C612FE72987D}"/>
+              </a:ext>
+            </a:extLst>
+          </p:cNvPr>
+          <p:cNvSpPr>
+            <a:spLocks noGrp="1"/>
+          </p:cNvSpPr>
+          <p:nvPr>
+            <p:ph type="sldNum" sz="quarter" idx="12"/>
+          </p:nvPr>
+        </p:nvSpPr>
+        <p:spPr/>
+        <p:txBody>
+          <a:bodyPr/>
+          <a:lstStyle/>
+          <a:p>
+            <a:fld id="{196B5BAB-2D3A-4897-B94A-ED1257D505D3}" type="slidenum">
+              <a:rPr lang="en-US" sz="1800" smtClean="0">
+                <a:solidFill>
+                  <a:schemeClr val="bg1"/>
+                </a:solidFill>
+              </a:rPr>
+              <a:pPr/>
+              <a:t>6</a:t>
+            </a:fld>
+            <a:endParaRPr lang="en-US" sz="1800" dirty="0">
+              <a:solidFill>
+                <a:schemeClr val="bg1"/>
+              </a:solidFill>
+            </a:endParaRPr>
+          </a:p>
+        </p:txBody>
+      </p:sp>
+      <p:pic>
+        <p:nvPicPr>
+          <p:cNvPr id="10" name="Объект 9">
+            <a:extLst>
+              <a:ext uri="{FF2B5EF4-FFF2-40B4-BE49-F238E27FC236}">
+                <a16:creationId xmlns:a16="http://schemas.microsoft.com/office/drawing/2014/main" id="{5D9B57D2-CA75-4360-823A-A4FE00EEB37F}"/>
+              </a:ext>
+            </a:extLst>
+          </p:cNvPr>
+          <p:cNvPicPr>
+            <a:picLocks noGrp="1" noChangeAspect="1"/>
+          </p:cNvPicPr>
+          <p:nvPr>
+            <p:ph idx="1"/>
+          </p:nvPr>
+        </p:nvPicPr>
+        <p:blipFill>
+          <a:blip r:embed="rId2">
+            <a:extLst>
+              <a:ext uri="{28A0092B-C50C-407E-A947-70E740481C1C}">
+                <a14:useLocalDpi xmlns:a14="http://schemas.microsoft.com/office/drawing/2010/main" val="0"/>
+              </a:ext>
+            </a:extLst>
+          </a:blip>
+          <a:stretch>
+            <a:fillRect/>
+          </a:stretch>
+        </p:blipFill>
+        <p:spPr>
+          <a:xfrm>
+            <a:off x="1398891" y="2005118"/>
+            <a:ext cx="9394217" cy="2847764"/>
+          </a:xfrm>
+        </p:spPr>
+      </p:pic>
+    </p:spTree>
+    <p:extLst>
+      <p:ext uri="{BB962C8B-B14F-4D97-AF65-F5344CB8AC3E}">
+        <p14:creationId xmlns:p14="http://schemas.microsoft.com/office/powerpoint/2010/main" val="788212578"/>
+      </p:ext>
+    </p:extLst>
+  </p:cSld>
+  <p:clrMapOvr>
+    <a:masterClrMapping/>
+  </p:clrMapOvr>
+</p:sld>
+</file>
+
+<file path=ppt/slides/slide7.xml><?xml version="1.0" encoding="utf-8"?>
 <p:sld xmlns:a="http://schemas.openxmlformats.org/drawingml/2006/main" xmlns:r="http://schemas.openxmlformats.org/officeDocument/2006/relationships" xmlns:p="http://schemas.openxmlformats.org/presentationml/2006/main">
   <p:cSld>
     <p:spTree>
@@ -4659,6 +4887,44 @@
           </a:ln>
         </p:spPr>
       </p:pic>
+      <p:sp>
+        <p:nvSpPr>
+          <p:cNvPr id="4" name="Номер слайда 3">
+            <a:extLst>
+              <a:ext uri="{FF2B5EF4-FFF2-40B4-BE49-F238E27FC236}">
+                <a16:creationId xmlns:a16="http://schemas.microsoft.com/office/drawing/2014/main" id="{350B472D-9F1E-4B62-8030-BF29AA68442B}"/>
+              </a:ext>
+            </a:extLst>
+          </p:cNvPr>
+          <p:cNvSpPr>
+            <a:spLocks noGrp="1"/>
+          </p:cNvSpPr>
+          <p:nvPr>
+            <p:ph type="sldNum" sz="quarter" idx="12"/>
+          </p:nvPr>
+        </p:nvSpPr>
+        <p:spPr/>
+        <p:txBody>
+          <a:bodyPr/>
+          <a:lstStyle/>
+          <a:p>
+            <a:fld id="{196B5BAB-2D3A-4897-B94A-ED1257D505D3}" type="slidenum">
+              <a:rPr lang="en-US" sz="1800" smtClean="0">
+                <a:solidFill>
+                  <a:schemeClr val="bg1"/>
+                </a:solidFill>
+              </a:rPr>
+              <a:pPr/>
+              <a:t>7</a:t>
+            </a:fld>
+            <a:endParaRPr lang="en-US" sz="1800" dirty="0">
+              <a:solidFill>
+                <a:schemeClr val="bg1"/>
+              </a:solidFill>
+            </a:endParaRPr>
+          </a:p>
+        </p:txBody>
+      </p:sp>
     </p:spTree>
     <p:extLst>
       <p:ext uri="{BB962C8B-B14F-4D97-AF65-F5344CB8AC3E}">
@@ -4672,7 +4938,7 @@
 </p:sld>
 </file>
 
-<file path=ppt/slides/slide7.xml><?xml version="1.0" encoding="utf-8"?>
+<file path=ppt/slides/slide8.xml><?xml version="1.0" encoding="utf-8"?>
 <p:sld xmlns:a="http://schemas.openxmlformats.org/drawingml/2006/main" xmlns:r="http://schemas.openxmlformats.org/officeDocument/2006/relationships" xmlns:p="http://schemas.openxmlformats.org/presentationml/2006/main">
   <p:cSld>
     <p:spTree>
@@ -4752,6 +5018,44 @@
           </a:xfrm>
         </p:spPr>
       </p:pic>
+      <p:sp>
+        <p:nvSpPr>
+          <p:cNvPr id="4" name="Номер слайда 3">
+            <a:extLst>
+              <a:ext uri="{FF2B5EF4-FFF2-40B4-BE49-F238E27FC236}">
+                <a16:creationId xmlns:a16="http://schemas.microsoft.com/office/drawing/2014/main" id="{6FB00360-DD93-4701-8843-B45123DDD136}"/>
+              </a:ext>
+            </a:extLst>
+          </p:cNvPr>
+          <p:cNvSpPr>
+            <a:spLocks noGrp="1"/>
+          </p:cNvSpPr>
+          <p:nvPr>
+            <p:ph type="sldNum" sz="quarter" idx="12"/>
+          </p:nvPr>
+        </p:nvSpPr>
+        <p:spPr/>
+        <p:txBody>
+          <a:bodyPr/>
+          <a:lstStyle/>
+          <a:p>
+            <a:fld id="{196B5BAB-2D3A-4897-B94A-ED1257D505D3}" type="slidenum">
+              <a:rPr lang="en-US" sz="1800" smtClean="0">
+                <a:solidFill>
+                  <a:schemeClr val="bg1"/>
+                </a:solidFill>
+              </a:rPr>
+              <a:pPr/>
+              <a:t>8</a:t>
+            </a:fld>
+            <a:endParaRPr lang="en-US" sz="1800" dirty="0">
+              <a:solidFill>
+                <a:schemeClr val="bg1"/>
+              </a:solidFill>
+            </a:endParaRPr>
+          </a:p>
+        </p:txBody>
+      </p:sp>
     </p:spTree>
     <p:extLst>
       <p:ext uri="{BB962C8B-B14F-4D97-AF65-F5344CB8AC3E}">
@@ -4765,7 +5069,7 @@
 </p:sld>
 </file>
 
-<file path=ppt/slides/slide8.xml><?xml version="1.0" encoding="utf-8"?>
+<file path=ppt/slides/slide9.xml><?xml version="1.0" encoding="utf-8"?>
 <p:sld xmlns:a="http://schemas.openxmlformats.org/drawingml/2006/main" xmlns:r="http://schemas.openxmlformats.org/officeDocument/2006/relationships" xmlns:p="http://schemas.openxmlformats.org/presentationml/2006/main">
   <p:cSld>
     <p:spTree>
@@ -4905,133 +5209,48 @@
           </a:prstGeom>
         </p:spPr>
       </p:pic>
+      <p:sp>
+        <p:nvSpPr>
+          <p:cNvPr id="5" name="Номер слайда 4">
+            <a:extLst>
+              <a:ext uri="{FF2B5EF4-FFF2-40B4-BE49-F238E27FC236}">
+                <a16:creationId xmlns:a16="http://schemas.microsoft.com/office/drawing/2014/main" id="{5D2A73A1-44E4-442E-AF81-D44C60BE5F29}"/>
+              </a:ext>
+            </a:extLst>
+          </p:cNvPr>
+          <p:cNvSpPr>
+            <a:spLocks noGrp="1"/>
+          </p:cNvSpPr>
+          <p:nvPr>
+            <p:ph type="sldNum" sz="quarter" idx="12"/>
+          </p:nvPr>
+        </p:nvSpPr>
+        <p:spPr/>
+        <p:txBody>
+          <a:bodyPr/>
+          <a:lstStyle/>
+          <a:p>
+            <a:fld id="{196B5BAB-2D3A-4897-B94A-ED1257D505D3}" type="slidenum">
+              <a:rPr lang="en-US" sz="1800" smtClean="0">
+                <a:solidFill>
+                  <a:schemeClr val="bg1"/>
+                </a:solidFill>
+              </a:rPr>
+              <a:pPr/>
+              <a:t>9</a:t>
+            </a:fld>
+            <a:endParaRPr lang="en-US" sz="1800" dirty="0">
+              <a:solidFill>
+                <a:schemeClr val="bg1"/>
+              </a:solidFill>
+            </a:endParaRPr>
+          </a:p>
+        </p:txBody>
+      </p:sp>
     </p:spTree>
     <p:extLst>
       <p:ext uri="{BB962C8B-B14F-4D97-AF65-F5344CB8AC3E}">
         <p14:creationId xmlns:p14="http://schemas.microsoft.com/office/powerpoint/2010/main" val="107703118"/>
-      </p:ext>
-    </p:extLst>
-  </p:cSld>
-  <p:clrMapOvr>
-    <a:masterClrMapping/>
-  </p:clrMapOvr>
-</p:sld>
-</file>
-
-<file path=ppt/slides/slide9.xml><?xml version="1.0" encoding="utf-8"?>
-<p:sld xmlns:a="http://schemas.openxmlformats.org/drawingml/2006/main" xmlns:r="http://schemas.openxmlformats.org/officeDocument/2006/relationships" xmlns:p="http://schemas.openxmlformats.org/presentationml/2006/main">
-  <p:cSld>
-    <p:spTree>
-      <p:nvGrpSpPr>
-        <p:cNvPr id="1" name=""/>
-        <p:cNvGrpSpPr/>
-        <p:nvPr/>
-      </p:nvGrpSpPr>
-      <p:grpSpPr>
-        <a:xfrm>
-          <a:off x="0" y="0"/>
-          <a:ext cx="0" cy="0"/>
-          <a:chOff x="0" y="0"/>
-          <a:chExt cx="0" cy="0"/>
-        </a:xfrm>
-      </p:grpSpPr>
-      <p:sp>
-        <p:nvSpPr>
-          <p:cNvPr id="2" name="Заголовок 1">
-            <a:extLst>
-              <a:ext uri="{FF2B5EF4-FFF2-40B4-BE49-F238E27FC236}">
-                <a16:creationId xmlns:a16="http://schemas.microsoft.com/office/drawing/2014/main" id="{0EE123EC-2E73-4D2D-84E4-AC36D88BA40F}"/>
-              </a:ext>
-            </a:extLst>
-          </p:cNvPr>
-          <p:cNvSpPr>
-            <a:spLocks noGrp="1"/>
-          </p:cNvSpPr>
-          <p:nvPr>
-            <p:ph type="title"/>
-          </p:nvPr>
-        </p:nvSpPr>
-        <p:spPr/>
-        <p:txBody>
-          <a:bodyPr/>
-          <a:lstStyle/>
-          <a:p>
-            <a:r>
-              <a:rPr lang="ru-RU" dirty="0"/>
-              <a:t>Распределение задач</a:t>
-            </a:r>
-          </a:p>
-        </p:txBody>
-      </p:sp>
-      <p:sp>
-        <p:nvSpPr>
-          <p:cNvPr id="3" name="Объект 2">
-            <a:extLst>
-              <a:ext uri="{FF2B5EF4-FFF2-40B4-BE49-F238E27FC236}">
-                <a16:creationId xmlns:a16="http://schemas.microsoft.com/office/drawing/2014/main" id="{FCA363A8-E6AF-421B-BAC1-576C3A4901BC}"/>
-              </a:ext>
-            </a:extLst>
-          </p:cNvPr>
-          <p:cNvSpPr>
-            <a:spLocks noGrp="1"/>
-          </p:cNvSpPr>
-          <p:nvPr>
-            <p:ph idx="1"/>
-          </p:nvPr>
-        </p:nvSpPr>
-        <p:spPr>
-          <a:xfrm>
-            <a:off x="838199" y="1690687"/>
-            <a:ext cx="11015445" cy="4802188"/>
-          </a:xfrm>
-        </p:spPr>
-        <p:txBody>
-          <a:bodyPr>
-            <a:normAutofit/>
-          </a:bodyPr>
-          <a:lstStyle/>
-          <a:p>
-            <a:pPr marL="817200" indent="-685800" defTabSz="936000">
-              <a:lnSpc>
-                <a:spcPct val="200000"/>
-              </a:lnSpc>
-              <a:buFont typeface="Arial" panose="020B0604020202020204" pitchFamily="34" charset="0"/>
-              <a:buChar char="‒"/>
-            </a:pPr>
-            <a:r>
-              <a:rPr lang="ru-RU" sz="3200" dirty="0">
-                <a:latin typeface="Arial" panose="020B0604020202020204" pitchFamily="34" charset="0"/>
-                <a:cs typeface="Arial" panose="020B0604020202020204" pitchFamily="34" charset="0"/>
-              </a:rPr>
-              <a:t>Яцкова В. Н.: анализ и обзор аналогов, источники информации, глоссарий, проверка итогового отчёта.</a:t>
-            </a:r>
-          </a:p>
-          <a:p>
-            <a:pPr marL="817200" indent="-685800" defTabSz="936000">
-              <a:lnSpc>
-                <a:spcPct val="200000"/>
-              </a:lnSpc>
-              <a:buFont typeface="Arial" panose="020B0604020202020204" pitchFamily="34" charset="0"/>
-              <a:buChar char="‒"/>
-            </a:pPr>
-            <a:r>
-              <a:rPr lang="ru-RU" sz="3200" dirty="0">
-                <a:latin typeface="Arial" panose="020B0604020202020204" pitchFamily="34" charset="0"/>
-                <a:cs typeface="Arial" panose="020B0604020202020204" pitchFamily="34" charset="0"/>
-              </a:rPr>
-              <a:t>Сапелкин А. Г.: архитектура, клиент, сервер, развертка, документация, тестирование и обзор.</a:t>
-            </a:r>
-            <a:endParaRPr lang="en-US" sz="3200" dirty="0">
-              <a:latin typeface="Arial" panose="020B0604020202020204" pitchFamily="34" charset="0"/>
-              <a:cs typeface="Arial" panose="020B0604020202020204" pitchFamily="34" charset="0"/>
-            </a:endParaRPr>
-          </a:p>
-        </p:txBody>
-      </p:sp>
-    </p:spTree>
-    <p:extLst>
-      <p:ext uri="{BB962C8B-B14F-4D97-AF65-F5344CB8AC3E}">
-        <p14:creationId xmlns:p14="http://schemas.microsoft.com/office/powerpoint/2010/main" val="788212578"/>
       </p:ext>
     </p:extLst>
   </p:cSld>

</xml_diff>